<commit_message>
added links to presentation and readme
</commit_message>
<xml_diff>
--- a/assets/ForeverPaws.pptx
+++ b/assets/ForeverPaws.pptx
@@ -5,7 +5,7 @@
     <p:sldMasterId id="2147483648" r:id="rId1"/>
   </p:sldMasterIdLst>
   <p:notesMasterIdLst>
-    <p:notesMasterId r:id="rId13"/>
+    <p:notesMasterId r:id="rId12"/>
   </p:notesMasterIdLst>
   <p:sldIdLst>
     <p:sldId id="270" r:id="rId2"/>
@@ -17,8 +17,7 @@
     <p:sldId id="277" r:id="rId8"/>
     <p:sldId id="279" r:id="rId9"/>
     <p:sldId id="280" r:id="rId10"/>
-    <p:sldId id="278" r:id="rId11"/>
-    <p:sldId id="281" r:id="rId12"/>
+    <p:sldId id="281" r:id="rId11"/>
   </p:sldIdLst>
   <p:sldSz cx="12192000" cy="6858000"/>
   <p:notesSz cx="6858000" cy="9144000"/>
@@ -128,7 +127,7 @@
 <file path=ppt/revisionInfo.xml><?xml version="1.0" encoding="utf-8"?>
 <p1510:revInfo xmlns:a="http://schemas.openxmlformats.org/drawingml/2006/main" xmlns:r="http://schemas.openxmlformats.org/officeDocument/2006/relationships" xmlns:p1510="http://schemas.microsoft.com/office/powerpoint/2015/10/main">
   <p1510:revLst>
-    <p1510:client id="{8CC59063-A105-4ED7-A1E1-E2620457DAC0}" v="595" dt="2023-06-26T22:16:20.116"/>
+    <p1510:client id="{8CC59063-A105-4ED7-A1E1-E2620457DAC0}" v="597" dt="2023-06-28T00:56:45.266"/>
   </p1510:revLst>
 </p1510:revInfo>
 </file>
@@ -138,7 +137,7 @@
   <pc:docChgLst>
     <pc:chgData name="Eva Longoria" userId="0fec5590cbd247dd" providerId="LiveId" clId="{8CC59063-A105-4ED7-A1E1-E2620457DAC0}"/>
     <pc:docChg chg="undo redo custSel addSld delSld modSld sldOrd modMainMaster">
-      <pc:chgData name="Eva Longoria" userId="0fec5590cbd247dd" providerId="LiveId" clId="{8CC59063-A105-4ED7-A1E1-E2620457DAC0}" dt="2023-06-26T22:16:40.202" v="3565" actId="403"/>
+      <pc:chgData name="Eva Longoria" userId="0fec5590cbd247dd" providerId="LiveId" clId="{8CC59063-A105-4ED7-A1E1-E2620457DAC0}" dt="2023-06-28T00:56:45.266" v="3567"/>
       <pc:docMkLst>
         <pc:docMk/>
       </pc:docMkLst>
@@ -1023,8 +1022,8 @@
           </ac:picMkLst>
         </pc:picChg>
       </pc:sldChg>
-      <pc:sldChg chg="addSp delSp modSp add mod ord">
-        <pc:chgData name="Eva Longoria" userId="0fec5590cbd247dd" providerId="LiveId" clId="{8CC59063-A105-4ED7-A1E1-E2620457DAC0}" dt="2023-06-26T22:11:12.882" v="3402" actId="14100"/>
+      <pc:sldChg chg="addSp delSp modSp add del mod ord">
+        <pc:chgData name="Eva Longoria" userId="0fec5590cbd247dd" providerId="LiveId" clId="{8CC59063-A105-4ED7-A1E1-E2620457DAC0}" dt="2023-06-27T01:58:23.459" v="3566" actId="47"/>
         <pc:sldMkLst>
           <pc:docMk/>
           <pc:sldMk cId="2552645905" sldId="278"/>
@@ -1070,12 +1069,20 @@
           </ac:picMkLst>
         </pc:picChg>
       </pc:sldChg>
-      <pc:sldChg chg="add ord">
-        <pc:chgData name="Eva Longoria" userId="0fec5590cbd247dd" providerId="LiveId" clId="{8CC59063-A105-4ED7-A1E1-E2620457DAC0}" dt="2023-06-26T21:58:53.583" v="2804"/>
+      <pc:sldChg chg="modSp add ord">
+        <pc:chgData name="Eva Longoria" userId="0fec5590cbd247dd" providerId="LiveId" clId="{8CC59063-A105-4ED7-A1E1-E2620457DAC0}" dt="2023-06-28T00:56:45.266" v="3567"/>
         <pc:sldMkLst>
           <pc:docMk/>
           <pc:sldMk cId="2454032173" sldId="279"/>
         </pc:sldMkLst>
+        <pc:picChg chg="mod">
+          <ac:chgData name="Eva Longoria" userId="0fec5590cbd247dd" providerId="LiveId" clId="{8CC59063-A105-4ED7-A1E1-E2620457DAC0}" dt="2023-06-28T00:56:45.266" v="3567"/>
+          <ac:picMkLst>
+            <pc:docMk/>
+            <pc:sldMk cId="2454032173" sldId="279"/>
+            <ac:picMk id="8" creationId="{C47B9826-14AA-04B9-1B0B-32088045C4D4}"/>
+          </ac:picMkLst>
+        </pc:picChg>
       </pc:sldChg>
       <pc:sldChg chg="addSp delSp modSp add mod ord">
         <pc:chgData name="Eva Longoria" userId="0fec5590cbd247dd" providerId="LiveId" clId="{8CC59063-A105-4ED7-A1E1-E2620457DAC0}" dt="2023-06-26T22:16:01.744" v="3536" actId="1076"/>
@@ -2018,7 +2025,7 @@
           <a:p>
             <a:fld id="{C48B9279-97D0-45BD-B4FA-3B342AB2E5CF}" type="slidenum">
               <a:rPr lang="en-US" smtClean="0"/>
-              <a:t>11</a:t>
+              <a:t>10</a:t>
             </a:fld>
             <a:endParaRPr lang="en-US"/>
           </a:p>
@@ -5590,729 +5597,6 @@
       </p:grpSpPr>
       <p:sp>
         <p:nvSpPr>
-          <p:cNvPr id="21" name="Rectangle 20">
-            <a:extLst>
-              <a:ext uri="{FF2B5EF4-FFF2-40B4-BE49-F238E27FC236}">
-                <a16:creationId xmlns:a16="http://schemas.microsoft.com/office/drawing/2014/main" id="{59467DF4-A54A-7FF0-BEDD-582A0DE30551}"/>
-              </a:ext>
-            </a:extLst>
-          </p:cNvPr>
-          <p:cNvSpPr/>
-          <p:nvPr/>
-        </p:nvSpPr>
-        <p:spPr>
-          <a:xfrm>
-            <a:off x="316933" y="261257"/>
-            <a:ext cx="11633912" cy="6233625"/>
-          </a:xfrm>
-          <a:prstGeom prst="rect">
-            <a:avLst/>
-          </a:prstGeom>
-          <a:solidFill>
-            <a:srgbClr val="F9E0BB"/>
-          </a:solidFill>
-        </p:spPr>
-        <p:style>
-          <a:lnRef idx="2">
-            <a:schemeClr val="accent1">
-              <a:shade val="15000"/>
-            </a:schemeClr>
-          </a:lnRef>
-          <a:fillRef idx="1">
-            <a:schemeClr val="accent1"/>
-          </a:fillRef>
-          <a:effectRef idx="0">
-            <a:schemeClr val="accent1"/>
-          </a:effectRef>
-          <a:fontRef idx="minor">
-            <a:schemeClr val="lt1"/>
-          </a:fontRef>
-        </p:style>
-        <p:txBody>
-          <a:bodyPr rtlCol="0" anchor="ctr"/>
-          <a:lstStyle/>
-          <a:p>
-            <a:pPr algn="ctr"/>
-            <a:endParaRPr lang="en-US" dirty="0"/>
-          </a:p>
-        </p:txBody>
-      </p:sp>
-      <p:sp>
-        <p:nvSpPr>
-          <p:cNvPr id="22" name="Rectangle 21">
-            <a:extLst>
-              <a:ext uri="{FF2B5EF4-FFF2-40B4-BE49-F238E27FC236}">
-                <a16:creationId xmlns:a16="http://schemas.microsoft.com/office/drawing/2014/main" id="{CFF2F5B6-14EF-AE76-3730-685467030AD3}"/>
-              </a:ext>
-            </a:extLst>
-          </p:cNvPr>
-          <p:cNvSpPr/>
-          <p:nvPr/>
-        </p:nvSpPr>
-        <p:spPr>
-          <a:xfrm>
-            <a:off x="494220" y="468775"/>
-            <a:ext cx="11282448" cy="5838240"/>
-          </a:xfrm>
-          <a:prstGeom prst="rect">
-            <a:avLst/>
-          </a:prstGeom>
-          <a:solidFill>
-            <a:srgbClr val="FFC26F"/>
-          </a:solidFill>
-        </p:spPr>
-        <p:style>
-          <a:lnRef idx="2">
-            <a:schemeClr val="accent6">
-              <a:shade val="15000"/>
-            </a:schemeClr>
-          </a:lnRef>
-          <a:fillRef idx="1">
-            <a:schemeClr val="accent6"/>
-          </a:fillRef>
-          <a:effectRef idx="0">
-            <a:schemeClr val="accent6"/>
-          </a:effectRef>
-          <a:fontRef idx="minor">
-            <a:schemeClr val="lt1"/>
-          </a:fontRef>
-        </p:style>
-        <p:txBody>
-          <a:bodyPr rtlCol="0" anchor="ctr"/>
-          <a:lstStyle/>
-          <a:p>
-            <a:pPr algn="ctr"/>
-            <a:endParaRPr lang="en-US" dirty="0"/>
-          </a:p>
-        </p:txBody>
-      </p:sp>
-      <p:sp>
-        <p:nvSpPr>
-          <p:cNvPr id="8" name="Subtitle 2">
-            <a:extLst>
-              <a:ext uri="{FF2B5EF4-FFF2-40B4-BE49-F238E27FC236}">
-                <a16:creationId xmlns:a16="http://schemas.microsoft.com/office/drawing/2014/main" id="{4D8D87EF-5719-F345-59F2-45B08B4A5D04}"/>
-              </a:ext>
-            </a:extLst>
-          </p:cNvPr>
-          <p:cNvSpPr txBox="1">
-            <a:spLocks/>
-          </p:cNvSpPr>
-          <p:nvPr/>
-        </p:nvSpPr>
-        <p:spPr>
-          <a:xfrm>
-            <a:off x="2604252" y="956318"/>
-            <a:ext cx="4038285" cy="4676076"/>
-          </a:xfrm>
-          <a:prstGeom prst="rect">
-            <a:avLst/>
-          </a:prstGeom>
-        </p:spPr>
-        <p:txBody>
-          <a:bodyPr>
-            <a:noAutofit/>
-          </a:bodyPr>
-          <a:lstStyle>
-            <a:lvl1pPr marL="228600" indent="-228600" algn="l" defTabSz="914400" rtl="0" eaLnBrk="1" latinLnBrk="0" hangingPunct="1">
-              <a:lnSpc>
-                <a:spcPct val="90000"/>
-              </a:lnSpc>
-              <a:spcBef>
-                <a:spcPts val="1000"/>
-              </a:spcBef>
-              <a:buFont typeface="Arial" panose="020B0604020202020204" pitchFamily="34" charset="0"/>
-              <a:buChar char="•"/>
-              <a:defRPr sz="2800" kern="1200">
-                <a:solidFill>
-                  <a:schemeClr val="tx1"/>
-                </a:solidFill>
-                <a:latin typeface="+mn-lt"/>
-                <a:ea typeface="+mn-ea"/>
-                <a:cs typeface="+mn-cs"/>
-              </a:defRPr>
-            </a:lvl1pPr>
-            <a:lvl2pPr marL="685800" indent="-228600" algn="l" defTabSz="914400" rtl="0" eaLnBrk="1" latinLnBrk="0" hangingPunct="1">
-              <a:lnSpc>
-                <a:spcPct val="90000"/>
-              </a:lnSpc>
-              <a:spcBef>
-                <a:spcPts val="500"/>
-              </a:spcBef>
-              <a:buFont typeface="Arial" panose="020B0604020202020204" pitchFamily="34" charset="0"/>
-              <a:buChar char="•"/>
-              <a:defRPr sz="2400" kern="1200">
-                <a:solidFill>
-                  <a:schemeClr val="tx1"/>
-                </a:solidFill>
-                <a:latin typeface="+mn-lt"/>
-                <a:ea typeface="+mn-ea"/>
-                <a:cs typeface="+mn-cs"/>
-              </a:defRPr>
-            </a:lvl2pPr>
-            <a:lvl3pPr marL="1143000" indent="-228600" algn="l" defTabSz="914400" rtl="0" eaLnBrk="1" latinLnBrk="0" hangingPunct="1">
-              <a:lnSpc>
-                <a:spcPct val="90000"/>
-              </a:lnSpc>
-              <a:spcBef>
-                <a:spcPts val="500"/>
-              </a:spcBef>
-              <a:buFont typeface="Arial" panose="020B0604020202020204" pitchFamily="34" charset="0"/>
-              <a:buChar char="•"/>
-              <a:defRPr sz="2000" kern="1200">
-                <a:solidFill>
-                  <a:schemeClr val="tx1"/>
-                </a:solidFill>
-                <a:latin typeface="+mn-lt"/>
-                <a:ea typeface="+mn-ea"/>
-                <a:cs typeface="+mn-cs"/>
-              </a:defRPr>
-            </a:lvl3pPr>
-            <a:lvl4pPr marL="1600200" indent="-228600" algn="l" defTabSz="914400" rtl="0" eaLnBrk="1" latinLnBrk="0" hangingPunct="1">
-              <a:lnSpc>
-                <a:spcPct val="90000"/>
-              </a:lnSpc>
-              <a:spcBef>
-                <a:spcPts val="500"/>
-              </a:spcBef>
-              <a:buFont typeface="Arial" panose="020B0604020202020204" pitchFamily="34" charset="0"/>
-              <a:buChar char="•"/>
-              <a:defRPr sz="1800" kern="1200">
-                <a:solidFill>
-                  <a:schemeClr val="tx1"/>
-                </a:solidFill>
-                <a:latin typeface="+mn-lt"/>
-                <a:ea typeface="+mn-ea"/>
-                <a:cs typeface="+mn-cs"/>
-              </a:defRPr>
-            </a:lvl4pPr>
-            <a:lvl5pPr marL="2057400" indent="-228600" algn="l" defTabSz="914400" rtl="0" eaLnBrk="1" latinLnBrk="0" hangingPunct="1">
-              <a:lnSpc>
-                <a:spcPct val="90000"/>
-              </a:lnSpc>
-              <a:spcBef>
-                <a:spcPts val="500"/>
-              </a:spcBef>
-              <a:buFont typeface="Arial" panose="020B0604020202020204" pitchFamily="34" charset="0"/>
-              <a:buChar char="•"/>
-              <a:defRPr sz="1800" kern="1200">
-                <a:solidFill>
-                  <a:schemeClr val="tx1"/>
-                </a:solidFill>
-                <a:latin typeface="+mn-lt"/>
-                <a:ea typeface="+mn-ea"/>
-                <a:cs typeface="+mn-cs"/>
-              </a:defRPr>
-            </a:lvl5pPr>
-            <a:lvl6pPr marL="2514600" indent="-228600" algn="l" defTabSz="914400" rtl="0" eaLnBrk="1" latinLnBrk="0" hangingPunct="1">
-              <a:lnSpc>
-                <a:spcPct val="90000"/>
-              </a:lnSpc>
-              <a:spcBef>
-                <a:spcPts val="500"/>
-              </a:spcBef>
-              <a:buFont typeface="Arial" panose="020B0604020202020204" pitchFamily="34" charset="0"/>
-              <a:buChar char="•"/>
-              <a:defRPr sz="1800" kern="1200">
-                <a:solidFill>
-                  <a:schemeClr val="tx1"/>
-                </a:solidFill>
-                <a:latin typeface="+mn-lt"/>
-                <a:ea typeface="+mn-ea"/>
-                <a:cs typeface="+mn-cs"/>
-              </a:defRPr>
-            </a:lvl6pPr>
-            <a:lvl7pPr marL="2971800" indent="-228600" algn="l" defTabSz="914400" rtl="0" eaLnBrk="1" latinLnBrk="0" hangingPunct="1">
-              <a:lnSpc>
-                <a:spcPct val="90000"/>
-              </a:lnSpc>
-              <a:spcBef>
-                <a:spcPts val="500"/>
-              </a:spcBef>
-              <a:buFont typeface="Arial" panose="020B0604020202020204" pitchFamily="34" charset="0"/>
-              <a:buChar char="•"/>
-              <a:defRPr sz="1800" kern="1200">
-                <a:solidFill>
-                  <a:schemeClr val="tx1"/>
-                </a:solidFill>
-                <a:latin typeface="+mn-lt"/>
-                <a:ea typeface="+mn-ea"/>
-                <a:cs typeface="+mn-cs"/>
-              </a:defRPr>
-            </a:lvl7pPr>
-            <a:lvl8pPr marL="3429000" indent="-228600" algn="l" defTabSz="914400" rtl="0" eaLnBrk="1" latinLnBrk="0" hangingPunct="1">
-              <a:lnSpc>
-                <a:spcPct val="90000"/>
-              </a:lnSpc>
-              <a:spcBef>
-                <a:spcPts val="500"/>
-              </a:spcBef>
-              <a:buFont typeface="Arial" panose="020B0604020202020204" pitchFamily="34" charset="0"/>
-              <a:buChar char="•"/>
-              <a:defRPr sz="1800" kern="1200">
-                <a:solidFill>
-                  <a:schemeClr val="tx1"/>
-                </a:solidFill>
-                <a:latin typeface="+mn-lt"/>
-                <a:ea typeface="+mn-ea"/>
-                <a:cs typeface="+mn-cs"/>
-              </a:defRPr>
-            </a:lvl8pPr>
-            <a:lvl9pPr marL="3886200" indent="-228600" algn="l" defTabSz="914400" rtl="0" eaLnBrk="1" latinLnBrk="0" hangingPunct="1">
-              <a:lnSpc>
-                <a:spcPct val="90000"/>
-              </a:lnSpc>
-              <a:spcBef>
-                <a:spcPts val="500"/>
-              </a:spcBef>
-              <a:buFont typeface="Arial" panose="020B0604020202020204" pitchFamily="34" charset="0"/>
-              <a:buChar char="•"/>
-              <a:defRPr sz="1800" kern="1200">
-                <a:solidFill>
-                  <a:schemeClr val="tx1"/>
-                </a:solidFill>
-                <a:latin typeface="+mn-lt"/>
-                <a:ea typeface="+mn-ea"/>
-                <a:cs typeface="+mn-cs"/>
-              </a:defRPr>
-            </a:lvl9pPr>
-          </a:lstStyle>
-          <a:p>
-            <a:pPr algn="just">
-              <a:lnSpc>
-                <a:spcPct val="100000"/>
-              </a:lnSpc>
-            </a:pPr>
-            <a:endParaRPr lang="en-US" sz="1600" dirty="0">
-              <a:latin typeface="Prometo" panose="020B0604030203060203" pitchFamily="34" charset="0"/>
-              <a:ea typeface="Roboto" pitchFamily="2" charset="0"/>
-            </a:endParaRPr>
-          </a:p>
-          <a:p>
-            <a:pPr algn="just">
-              <a:lnSpc>
-                <a:spcPct val="100000"/>
-              </a:lnSpc>
-            </a:pPr>
-            <a:r>
-              <a:rPr lang="en-US" sz="1600" dirty="0">
-                <a:latin typeface="Prometo" panose="020B0604030203060203" pitchFamily="34" charset="0"/>
-                <a:ea typeface="Roboto" pitchFamily="2" charset="0"/>
-              </a:rPr>
-              <a:t>Creating a dashboard that is unique for shelters or rescue agencies where they can add, remove, modify pet records </a:t>
-            </a:r>
-          </a:p>
-          <a:p>
-            <a:pPr algn="just">
-              <a:lnSpc>
-                <a:spcPct val="100000"/>
-              </a:lnSpc>
-            </a:pPr>
-            <a:endParaRPr lang="en-US" sz="1600" dirty="0">
-              <a:latin typeface="Prometo" panose="020B0604030203060203" pitchFamily="34" charset="0"/>
-              <a:ea typeface="Roboto" pitchFamily="2" charset="0"/>
-            </a:endParaRPr>
-          </a:p>
-          <a:p>
-            <a:pPr algn="just">
-              <a:lnSpc>
-                <a:spcPct val="100000"/>
-              </a:lnSpc>
-            </a:pPr>
-            <a:r>
-              <a:rPr lang="en-US" sz="1600" dirty="0">
-                <a:latin typeface="Prometo" panose="020B0604030203060203" pitchFamily="34" charset="0"/>
-                <a:ea typeface="Roboto" pitchFamily="2" charset="0"/>
-              </a:rPr>
-              <a:t>Implement commenting functionality to allow other users post what they think about the pet and read other users’ comments</a:t>
-            </a:r>
-          </a:p>
-          <a:p>
-            <a:pPr algn="just">
-              <a:lnSpc>
-                <a:spcPct val="100000"/>
-              </a:lnSpc>
-            </a:pPr>
-            <a:endParaRPr lang="en-US" sz="1600" dirty="0">
-              <a:latin typeface="Prometo" panose="020B0604030203060203" pitchFamily="34" charset="0"/>
-              <a:ea typeface="Roboto" pitchFamily="2" charset="0"/>
-            </a:endParaRPr>
-          </a:p>
-          <a:p>
-            <a:pPr algn="just">
-              <a:lnSpc>
-                <a:spcPct val="100000"/>
-              </a:lnSpc>
-            </a:pPr>
-            <a:r>
-              <a:rPr lang="en-US" sz="1600" dirty="0">
-                <a:latin typeface="Prometo" panose="020B0604030203060203" pitchFamily="34" charset="0"/>
-                <a:ea typeface="Roboto" pitchFamily="2" charset="0"/>
-              </a:rPr>
-              <a:t>Add geolocation functionality to increase our reach</a:t>
-            </a:r>
-          </a:p>
-          <a:p>
-            <a:pPr algn="just">
-              <a:lnSpc>
-                <a:spcPct val="100000"/>
-              </a:lnSpc>
-            </a:pPr>
-            <a:endParaRPr lang="en-US" sz="1600" dirty="0">
-              <a:latin typeface="Prometo" panose="020B0604030203060203" pitchFamily="34" charset="0"/>
-              <a:ea typeface="Roboto" pitchFamily="2" charset="0"/>
-            </a:endParaRPr>
-          </a:p>
-          <a:p>
-            <a:pPr algn="just">
-              <a:lnSpc>
-                <a:spcPct val="100000"/>
-              </a:lnSpc>
-            </a:pPr>
-            <a:r>
-              <a:rPr lang="en-US" sz="1600" dirty="0">
-                <a:latin typeface="Prometo" panose="020B0604030203060203" pitchFamily="34" charset="0"/>
-                <a:ea typeface="Roboto" pitchFamily="2" charset="0"/>
-              </a:rPr>
-              <a:t>Combine with social media channels to increase our visits volume</a:t>
-            </a:r>
-          </a:p>
-          <a:p>
-            <a:pPr algn="just">
-              <a:lnSpc>
-                <a:spcPct val="100000"/>
-              </a:lnSpc>
-            </a:pPr>
-            <a:endParaRPr lang="en-US" sz="1600" dirty="0">
-              <a:latin typeface="Prometo" panose="020B0604030203060203" pitchFamily="34" charset="0"/>
-              <a:ea typeface="Roboto" pitchFamily="2" charset="0"/>
-            </a:endParaRPr>
-          </a:p>
-          <a:p>
-            <a:pPr algn="just">
-              <a:lnSpc>
-                <a:spcPct val="100000"/>
-              </a:lnSpc>
-            </a:pPr>
-            <a:endParaRPr lang="en-US" sz="1600" dirty="0">
-              <a:latin typeface="Roboto" pitchFamily="2" charset="0"/>
-              <a:ea typeface="Roboto" pitchFamily="2" charset="0"/>
-            </a:endParaRPr>
-          </a:p>
-        </p:txBody>
-      </p:sp>
-      <p:cxnSp>
-        <p:nvCxnSpPr>
-          <p:cNvPr id="37" name="Straight Connector 36">
-            <a:extLst>
-              <a:ext uri="{FF2B5EF4-FFF2-40B4-BE49-F238E27FC236}">
-                <a16:creationId xmlns:a16="http://schemas.microsoft.com/office/drawing/2014/main" id="{331793C7-1AFF-6813-2ACE-C27F132E8978}"/>
-              </a:ext>
-            </a:extLst>
-          </p:cNvPr>
-          <p:cNvCxnSpPr>
-            <a:cxnSpLocks/>
-          </p:cNvCxnSpPr>
-          <p:nvPr/>
-        </p:nvCxnSpPr>
-        <p:spPr>
-          <a:xfrm>
-            <a:off x="494220" y="1225606"/>
-            <a:ext cx="3394492" cy="0"/>
-          </a:xfrm>
-          <a:prstGeom prst="line">
-            <a:avLst/>
-          </a:prstGeom>
-          <a:ln w="38100">
-            <a:solidFill>
-              <a:srgbClr val="673C29"/>
-            </a:solidFill>
-          </a:ln>
-        </p:spPr>
-        <p:style>
-          <a:lnRef idx="1">
-            <a:schemeClr val="accent1"/>
-          </a:lnRef>
-          <a:fillRef idx="0">
-            <a:schemeClr val="accent1"/>
-          </a:fillRef>
-          <a:effectRef idx="0">
-            <a:schemeClr val="accent1"/>
-          </a:effectRef>
-          <a:fontRef idx="minor">
-            <a:schemeClr val="tx1"/>
-          </a:fontRef>
-        </p:style>
-      </p:cxnSp>
-      <p:sp>
-        <p:nvSpPr>
-          <p:cNvPr id="7" name="Title 1">
-            <a:extLst>
-              <a:ext uri="{FF2B5EF4-FFF2-40B4-BE49-F238E27FC236}">
-                <a16:creationId xmlns:a16="http://schemas.microsoft.com/office/drawing/2014/main" id="{97DA21C3-0860-41E0-ADE5-AEC3511FDAC8}"/>
-              </a:ext>
-            </a:extLst>
-          </p:cNvPr>
-          <p:cNvSpPr txBox="1">
-            <a:spLocks/>
-          </p:cNvSpPr>
-          <p:nvPr/>
-        </p:nvSpPr>
-        <p:spPr>
-          <a:xfrm>
-            <a:off x="773325" y="47597"/>
-            <a:ext cx="3292674" cy="1200329"/>
-          </a:xfrm>
-          <a:prstGeom prst="rect">
-            <a:avLst/>
-          </a:prstGeom>
-        </p:spPr>
-        <p:txBody>
-          <a:bodyPr anchor="b">
-            <a:noAutofit/>
-          </a:bodyPr>
-          <a:lstStyle>
-            <a:lvl1pPr algn="l" defTabSz="914400" rtl="0" eaLnBrk="1" latinLnBrk="0" hangingPunct="1">
-              <a:lnSpc>
-                <a:spcPct val="90000"/>
-              </a:lnSpc>
-              <a:spcBef>
-                <a:spcPct val="0"/>
-              </a:spcBef>
-              <a:buNone/>
-              <a:defRPr sz="4400" kern="1200">
-                <a:solidFill>
-                  <a:schemeClr val="tx1"/>
-                </a:solidFill>
-                <a:latin typeface="+mj-lt"/>
-                <a:ea typeface="+mj-ea"/>
-                <a:cs typeface="+mj-cs"/>
-              </a:defRPr>
-            </a:lvl1pPr>
-          </a:lstStyle>
-          <a:p>
-            <a:r>
-              <a:rPr lang="en-US" dirty="0">
-                <a:effectLst>
-                  <a:outerShdw blurRad="38100" dist="38100" dir="2700000" algn="tl">
-                    <a:srgbClr val="000000">
-                      <a:alpha val="43137"/>
-                    </a:srgbClr>
-                  </a:outerShdw>
-                </a:effectLst>
-                <a:latin typeface="Prometo" panose="020B0604030203060203" pitchFamily="34" charset="0"/>
-                <a:ea typeface="Roboto" pitchFamily="2" charset="0"/>
-                <a:cs typeface="+mn-cs"/>
-              </a:rPr>
-              <a:t>Future Dev</a:t>
-            </a:r>
-            <a:r>
-              <a:rPr lang="en-US" dirty="0">
-                <a:solidFill>
-                  <a:schemeClr val="bg1"/>
-                </a:solidFill>
-                <a:effectLst>
-                  <a:outerShdw blurRad="38100" dist="38100" dir="2700000" algn="tl">
-                    <a:srgbClr val="000000">
-                      <a:alpha val="43137"/>
-                    </a:srgbClr>
-                  </a:outerShdw>
-                </a:effectLst>
-                <a:latin typeface="Prometo" panose="020B0604030203060203" pitchFamily="34" charset="0"/>
-                <a:ea typeface="Roboto" pitchFamily="2" charset="0"/>
-                <a:cs typeface="+mn-cs"/>
-              </a:rPr>
-              <a:t> </a:t>
-            </a:r>
-            <a:endParaRPr lang="en-US" dirty="0">
-              <a:effectLst>
-                <a:outerShdw blurRad="38100" dist="38100" dir="2700000" algn="tl">
-                  <a:srgbClr val="000000">
-                    <a:alpha val="43137"/>
-                  </a:srgbClr>
-                </a:outerShdw>
-              </a:effectLst>
-              <a:latin typeface="Prometo" panose="020B0604030203060203" pitchFamily="34" charset="0"/>
-              <a:ea typeface="Roboto" pitchFamily="2" charset="0"/>
-              <a:cs typeface="+mn-cs"/>
-            </a:endParaRPr>
-          </a:p>
-        </p:txBody>
-      </p:sp>
-      <p:pic>
-        <p:nvPicPr>
-          <p:cNvPr id="3" name="Picture 2">
-            <a:extLst>
-              <a:ext uri="{FF2B5EF4-FFF2-40B4-BE49-F238E27FC236}">
-                <a16:creationId xmlns:a16="http://schemas.microsoft.com/office/drawing/2014/main" id="{1B9D4570-85D6-2CE7-DACA-3626761365C9}"/>
-              </a:ext>
-            </a:extLst>
-          </p:cNvPr>
-          <p:cNvPicPr>
-            <a:picLocks noChangeAspect="1"/>
-          </p:cNvPicPr>
-          <p:nvPr/>
-        </p:nvPicPr>
-        <p:blipFill>
-          <a:blip r:embed="rId2">
-            <a:extLst>
-              <a:ext uri="{BEBA8EAE-BF5A-486C-A8C5-ECC9F3942E4B}">
-                <a14:imgProps xmlns:a14="http://schemas.microsoft.com/office/drawing/2010/main">
-                  <a14:imgLayer r:embed="rId3">
-                    <a14:imgEffect>
-                      <a14:backgroundRemoval t="5242" b="93145" l="8993" r="89209">
-                        <a14:foregroundMark x1="32734" y1="92339" x2="32734" y2="92339"/>
-                        <a14:foregroundMark x1="22302" y1="91129" x2="22302" y2="91129"/>
-                        <a14:foregroundMark x1="53237" y1="88710" x2="53237" y2="88710"/>
-                        <a14:foregroundMark x1="53237" y1="59274" x2="54317" y2="26613"/>
-                        <a14:foregroundMark x1="58273" y1="31048" x2="59353" y2="50000"/>
-                        <a14:foregroundMark x1="60072" y1="54435" x2="55755" y2="31048"/>
-                        <a14:foregroundMark x1="59712" y1="31452" x2="64388" y2="44355"/>
-                        <a14:foregroundMark x1="63309" y1="31048" x2="63309" y2="31048"/>
-                        <a14:foregroundMark x1="62230" y1="28226" x2="62230" y2="28226"/>
-                        <a14:foregroundMark x1="24101" y1="47177" x2="21583" y2="25403"/>
-                        <a14:foregroundMark x1="28777" y1="22177" x2="31295" y2="14919"/>
-                        <a14:foregroundMark x1="41727" y1="8871" x2="41727" y2="8871"/>
-                        <a14:foregroundMark x1="29856" y1="5645" x2="29856" y2="5645"/>
-                        <a14:foregroundMark x1="13309" y1="45968" x2="21942" y2="72984"/>
-                        <a14:foregroundMark x1="22302" y1="80645" x2="10791" y2="52016"/>
-                        <a14:foregroundMark x1="10791" y1="52016" x2="20863" y2="23790"/>
-                        <a14:foregroundMark x1="20863" y1="23790" x2="25540" y2="19758"/>
-                        <a14:foregroundMark x1="24820" y1="16935" x2="15827" y2="31048"/>
-                        <a14:foregroundMark x1="11511" y1="39516" x2="8993" y2="52016"/>
-                        <a14:foregroundMark x1="11511" y1="41935" x2="14029" y2="35484"/>
-                        <a14:foregroundMark x1="58273" y1="25000" x2="58273" y2="25000"/>
-                        <a14:foregroundMark x1="35612" y1="93145" x2="54317" y2="91532"/>
-                        <a14:foregroundMark x1="54317" y1="91532" x2="54317" y2="91532"/>
-                        <a14:foregroundMark x1="64388" y1="67339" x2="65827" y2="58065"/>
-                        <a14:foregroundMark x1="59712" y1="79435" x2="63309" y2="53629"/>
-                        <a14:foregroundMark x1="62950" y1="63710" x2="62230" y2="78226"/>
-                        <a14:foregroundMark x1="62950" y1="30242" x2="52878" y2="18548"/>
-                        <a14:foregroundMark x1="65827" y1="27823" x2="41727" y2="10887"/>
-                        <a14:foregroundMark x1="41727" y1="10887" x2="39568" y2="10887"/>
-                        <a14:foregroundMark x1="20144" y1="20565" x2="12590" y2="27016"/>
-                      </a14:backgroundRemoval>
-                    </a14:imgEffect>
-                  </a14:imgLayer>
-                </a14:imgProps>
-              </a:ext>
-            </a:extLst>
-          </a:blip>
-          <a:stretch>
-            <a:fillRect/>
-          </a:stretch>
-        </p:blipFill>
-        <p:spPr>
-          <a:xfrm>
-            <a:off x="345845" y="1035971"/>
-            <a:ext cx="3504023" cy="3125891"/>
-          </a:xfrm>
-          <a:prstGeom prst="rect">
-            <a:avLst/>
-          </a:prstGeom>
-        </p:spPr>
-      </p:pic>
-      <p:pic>
-        <p:nvPicPr>
-          <p:cNvPr id="5" name="Picture 4">
-            <a:extLst>
-              <a:ext uri="{FF2B5EF4-FFF2-40B4-BE49-F238E27FC236}">
-                <a16:creationId xmlns:a16="http://schemas.microsoft.com/office/drawing/2014/main" id="{068955B0-A125-49ED-E25C-60D4B7E70D9A}"/>
-              </a:ext>
-            </a:extLst>
-          </p:cNvPr>
-          <p:cNvPicPr>
-            <a:picLocks noChangeAspect="1"/>
-          </p:cNvPicPr>
-          <p:nvPr/>
-        </p:nvPicPr>
-        <p:blipFill>
-          <a:blip r:embed="rId4">
-            <a:extLst>
-              <a:ext uri="{BEBA8EAE-BF5A-486C-A8C5-ECC9F3942E4B}">
-                <a14:imgProps xmlns:a14="http://schemas.microsoft.com/office/drawing/2010/main">
-                  <a14:imgLayer r:embed="rId5">
-                    <a14:imgEffect>
-                      <a14:backgroundRemoval t="3455" b="98364" l="1856" r="99794">
-                        <a14:foregroundMark x1="45773" y1="8909" x2="52371" y2="7091"/>
-                        <a14:foregroundMark x1="51134" y1="3455" x2="51134" y2="3455"/>
-                        <a14:foregroundMark x1="36907" y1="91818" x2="61856" y2="92727"/>
-                        <a14:foregroundMark x1="61856" y1="92727" x2="68866" y2="91455"/>
-                        <a14:foregroundMark x1="83711" y1="89455" x2="89691" y2="84727"/>
-                        <a14:foregroundMark x1="94433" y1="85636" x2="94433" y2="85636"/>
-                        <a14:foregroundMark x1="94433" y1="85636" x2="88660" y2="91273"/>
-                        <a14:foregroundMark x1="9691" y1="94727" x2="64124" y2="97091"/>
-                        <a14:foregroundMark x1="64124" y1="97091" x2="90103" y2="95273"/>
-                        <a14:foregroundMark x1="92165" y1="94364" x2="96289" y2="89273"/>
-                        <a14:foregroundMark x1="2887" y1="91818" x2="8866" y2="96364"/>
-                        <a14:foregroundMark x1="8041" y1="83818" x2="2887" y2="88182"/>
-                        <a14:foregroundMark x1="33402" y1="98545" x2="10515" y2="97636"/>
-                        <a14:foregroundMark x1="8660" y1="98727" x2="3093" y2="90909"/>
-                        <a14:foregroundMark x1="3093" y1="90909" x2="3093" y2="90727"/>
-                        <a14:foregroundMark x1="95670" y1="96909" x2="95670" y2="96909"/>
-                        <a14:foregroundMark x1="93402" y1="97636" x2="95876" y2="90909"/>
-                        <a14:foregroundMark x1="90928" y1="82909" x2="96701" y2="86727"/>
-                        <a14:foregroundMark x1="97732" y1="89455" x2="97526" y2="97455"/>
-                        <a14:foregroundMark x1="97526" y1="97455" x2="96289" y2="87273"/>
-                        <a14:foregroundMark x1="96289" y1="87273" x2="93608" y2="83273"/>
-                        <a14:foregroundMark x1="94845" y1="82727" x2="99794" y2="88182"/>
-                        <a14:foregroundMark x1="96907" y1="81818" x2="96907" y2="81818"/>
-                        <a14:foregroundMark x1="97526" y1="80182" x2="97526" y2="80182"/>
-                        <a14:foregroundMark x1="98144" y1="79455" x2="98144" y2="79455"/>
-                        <a14:foregroundMark x1="1856" y1="84000" x2="1856" y2="84000"/>
-                      </a14:backgroundRemoval>
-                    </a14:imgEffect>
-                  </a14:imgLayer>
-                </a14:imgProps>
-              </a:ext>
-            </a:extLst>
-          </a:blip>
-          <a:stretch>
-            <a:fillRect/>
-          </a:stretch>
-        </p:blipFill>
-        <p:spPr>
-          <a:xfrm>
-            <a:off x="9114932" y="3333360"/>
-            <a:ext cx="2467468" cy="2798160"/>
-          </a:xfrm>
-          <a:prstGeom prst="rect">
-            <a:avLst/>
-          </a:prstGeom>
-        </p:spPr>
-      </p:pic>
-    </p:spTree>
-    <p:extLst>
-      <p:ext uri="{BB962C8B-B14F-4D97-AF65-F5344CB8AC3E}">
-        <p14:creationId xmlns:p14="http://schemas.microsoft.com/office/powerpoint/2010/main" val="2552645905"/>
-      </p:ext>
-    </p:extLst>
-  </p:cSld>
-  <p:clrMapOvr>
-    <a:masterClrMapping/>
-  </p:clrMapOvr>
-</p:sld>
-</file>
-
-<file path=ppt/slides/slide11.xml><?xml version="1.0" encoding="utf-8"?>
-<p:sld xmlns:a="http://schemas.openxmlformats.org/drawingml/2006/main" xmlns:r="http://schemas.openxmlformats.org/officeDocument/2006/relationships" xmlns:p="http://schemas.openxmlformats.org/presentationml/2006/main">
-  <p:cSld>
-    <p:spTree>
-      <p:nvGrpSpPr>
-        <p:cNvPr id="1" name=""/>
-        <p:cNvGrpSpPr/>
-        <p:nvPr/>
-      </p:nvGrpSpPr>
-      <p:grpSpPr>
-        <a:xfrm>
-          <a:off x="0" y="0"/>
-          <a:ext cx="0" cy="0"/>
-          <a:chOff x="0" y="0"/>
-          <a:chExt cx="0" cy="0"/>
-        </a:xfrm>
-      </p:grpSpPr>
-      <p:sp>
-        <p:nvSpPr>
           <p:cNvPr id="3" name="TextBox 2">
             <a:extLst>
               <a:ext uri="{FF2B5EF4-FFF2-40B4-BE49-F238E27FC236}">
@@ -12898,6 +12182,7 @@
       <p:pic>
         <p:nvPicPr>
           <p:cNvPr id="8" name="Picture 7">
+            <a:hlinkClick r:id="rId3"/>
             <a:extLst>
               <a:ext uri="{FF2B5EF4-FFF2-40B4-BE49-F238E27FC236}">
                 <a16:creationId xmlns:a16="http://schemas.microsoft.com/office/drawing/2014/main" id="{C47B9826-14AA-04B9-1B0B-32088045C4D4}"/>
@@ -12910,7 +12195,7 @@
           <p:nvPr/>
         </p:nvPicPr>
         <p:blipFill>
-          <a:blip r:embed="rId3"/>
+          <a:blip r:embed="rId4"/>
           <a:stretch>
             <a:fillRect/>
           </a:stretch>
@@ -13491,9 +12776,14 @@
               <a:rPr lang="en-US" sz="2400" dirty="0">
                 <a:latin typeface="Prometo" panose="020B0604030203060203" pitchFamily="34" charset="0"/>
                 <a:ea typeface="Roboto" pitchFamily="2" charset="0"/>
+                <a:hlinkClick r:id="rId4"/>
               </a:rPr>
               <a:t>ForeverPaws Heroku</a:t>
             </a:r>
+            <a:endParaRPr lang="en-US" sz="2400" dirty="0">
+              <a:latin typeface="Prometo" panose="020B0604030203060203" pitchFamily="34" charset="0"/>
+              <a:ea typeface="Roboto" pitchFamily="2" charset="0"/>
+            </a:endParaRPr>
           </a:p>
           <a:p>
             <a:pPr marL="0" indent="0" algn="just">
@@ -13887,11 +13177,11 @@
           <p:nvPr/>
         </p:nvPicPr>
         <p:blipFill>
-          <a:blip r:embed="rId4">
+          <a:blip r:embed="rId5">
             <a:extLst>
               <a:ext uri="{BEBA8EAE-BF5A-486C-A8C5-ECC9F3942E4B}">
                 <a14:imgProps xmlns:a14="http://schemas.microsoft.com/office/drawing/2010/main">
-                  <a14:imgLayer r:embed="rId5">
+                  <a14:imgLayer r:embed="rId6">
                     <a14:imgEffect>
                       <a14:backgroundRemoval t="5242" b="93145" l="8993" r="89209">
                         <a14:foregroundMark x1="32734" y1="92339" x2="32734" y2="92339"/>
@@ -13960,11 +13250,11 @@
           <p:nvPr/>
         </p:nvPicPr>
         <p:blipFill>
-          <a:blip r:embed="rId6">
+          <a:blip r:embed="rId7">
             <a:extLst>
               <a:ext uri="{BEBA8EAE-BF5A-486C-A8C5-ECC9F3942E4B}">
                 <a14:imgProps xmlns:a14="http://schemas.microsoft.com/office/drawing/2010/main">
-                  <a14:imgLayer r:embed="rId7">
+                  <a14:imgLayer r:embed="rId8">
                     <a14:imgEffect>
                       <a14:backgroundRemoval t="3455" b="98364" l="1856" r="99794">
                         <a14:foregroundMark x1="45773" y1="8909" x2="52371" y2="7091"/>

</xml_diff>